<commit_message>
rewrote the dashboard.R so it uses shiny instead, added two experimental plots with interactive input options
</commit_message>
<xml_diff>
--- a/Prezentacja2.pptx
+++ b/Prezentacja2.pptx
@@ -17,7 +17,8 @@
     <p:sldId id="264" r:id="rId11"/>
     <p:sldId id="265" r:id="rId12"/>
     <p:sldId id="266" r:id="rId13"/>
-    <p:sldId id="267" r:id="rId14"/>
+    <p:sldId id="269" r:id="rId14"/>
+    <p:sldId id="267" r:id="rId15"/>
   </p:sldIdLst>
   <p:sldSz cx="12192000" cy="6858000"/>
   <p:notesSz cx="6858000" cy="9144000"/>
@@ -936,7 +937,7 @@
           <a:p>
             <a:fld id="{7CF0BCE0-945C-4FDF-95A1-2149B1FF5B83}" type="datetimeFigureOut">
               <a:rPr lang="en-US" smtClean="0"/>
-              <a:t>1/19/2024</a:t>
+              <a:t>1/20/2024</a:t>
             </a:fld>
             <a:endParaRPr lang="en-US"/>
           </a:p>
@@ -1661,7 +1662,7 @@
           <a:p>
             <a:fld id="{7CF0BCE0-945C-4FDF-95A1-2149B1FF5B83}" type="datetimeFigureOut">
               <a:rPr lang="en-US" smtClean="0"/>
-              <a:t>1/19/2024</a:t>
+              <a:t>1/20/2024</a:t>
             </a:fld>
             <a:endParaRPr lang="en-US"/>
           </a:p>
@@ -2533,7 +2534,7 @@
           <a:p>
             <a:fld id="{7CF0BCE0-945C-4FDF-95A1-2149B1FF5B83}" type="datetimeFigureOut">
               <a:rPr lang="en-US" smtClean="0"/>
-              <a:t>1/19/2024</a:t>
+              <a:t>1/20/2024</a:t>
             </a:fld>
             <a:endParaRPr lang="en-US"/>
           </a:p>
@@ -3235,7 +3236,7 @@
           <a:p>
             <a:fld id="{7CF0BCE0-945C-4FDF-95A1-2149B1FF5B83}" type="datetimeFigureOut">
               <a:rPr lang="en-US" smtClean="0"/>
-              <a:t>1/19/2024</a:t>
+              <a:t>1/20/2024</a:t>
             </a:fld>
             <a:endParaRPr lang="en-US"/>
           </a:p>
@@ -3944,7 +3945,7 @@
           <a:p>
             <a:fld id="{7CF0BCE0-945C-4FDF-95A1-2149B1FF5B83}" type="datetimeFigureOut">
               <a:rPr lang="en-US" smtClean="0"/>
-              <a:t>1/19/2024</a:t>
+              <a:t>1/20/2024</a:t>
             </a:fld>
             <a:endParaRPr lang="en-US"/>
           </a:p>
@@ -4878,7 +4879,7 @@
           <a:p>
             <a:fld id="{7CF0BCE0-945C-4FDF-95A1-2149B1FF5B83}" type="datetimeFigureOut">
               <a:rPr lang="en-US" smtClean="0"/>
-              <a:t>1/19/2024</a:t>
+              <a:t>1/20/2024</a:t>
             </a:fld>
             <a:endParaRPr lang="en-US"/>
           </a:p>
@@ -6095,7 +6096,7 @@
           <a:p>
             <a:fld id="{7CF0BCE0-945C-4FDF-95A1-2149B1FF5B83}" type="datetimeFigureOut">
               <a:rPr lang="en-US" smtClean="0"/>
-              <a:t>1/19/2024</a:t>
+              <a:t>1/20/2024</a:t>
             </a:fld>
             <a:endParaRPr lang="en-US"/>
           </a:p>
@@ -6760,7 +6761,7 @@
           <a:p>
             <a:fld id="{7CF0BCE0-945C-4FDF-95A1-2149B1FF5B83}" type="datetimeFigureOut">
               <a:rPr lang="en-US" smtClean="0"/>
-              <a:t>1/19/2024</a:t>
+              <a:t>1/20/2024</a:t>
             </a:fld>
             <a:endParaRPr lang="en-US"/>
           </a:p>
@@ -7529,7 +7530,7 @@
           <a:p>
             <a:fld id="{7CF0BCE0-945C-4FDF-95A1-2149B1FF5B83}" type="datetimeFigureOut">
               <a:rPr lang="en-US" smtClean="0"/>
-              <a:t>1/19/2024</a:t>
+              <a:t>1/20/2024</a:t>
             </a:fld>
             <a:endParaRPr lang="en-US"/>
           </a:p>
@@ -8639,7 +8640,7 @@
           <a:p>
             <a:fld id="{7CF0BCE0-945C-4FDF-95A1-2149B1FF5B83}" type="datetimeFigureOut">
               <a:rPr lang="en-US" smtClean="0"/>
-              <a:t>1/19/2024</a:t>
+              <a:t>1/20/2024</a:t>
             </a:fld>
             <a:endParaRPr lang="en-US"/>
           </a:p>
@@ -9445,7 +9446,7 @@
           <a:p>
             <a:fld id="{7CF0BCE0-945C-4FDF-95A1-2149B1FF5B83}" type="datetimeFigureOut">
               <a:rPr lang="en-US" smtClean="0"/>
-              <a:t>1/19/2024</a:t>
+              <a:t>1/20/2024</a:t>
             </a:fld>
             <a:endParaRPr lang="en-US"/>
           </a:p>
@@ -9727,7 +9728,7 @@
             <a:fld id="{7CF0BCE0-945C-4FDF-95A1-2149B1FF5B83}" type="datetimeFigureOut">
               <a:rPr lang="en-US" smtClean="0"/>
               <a:pPr algn="r"/>
-              <a:t>1/19/2024</a:t>
+              <a:t>1/20/2024</a:t>
             </a:fld>
             <a:endParaRPr lang="en-US"/>
           </a:p>
@@ -10116,7 +10117,7 @@
                 <a16:creationId xmlns:a16="http://schemas.microsoft.com/office/drawing/2014/main" id="{9C51935E-4A08-4AE4-8E13-F40CD3C4F1C4}"/>
               </a:ext>
               <a:ext uri="{C183D7F6-B498-43B3-948B-1728B52AA6E4}">
-                <adec:decorative xmlns:adec="http://schemas.microsoft.com/office/drawing/2017/decorative" val="1"/>
+                <adec:decorative xmlns:adec="http://schemas.microsoft.com/office/drawing/2017/decorative" xmlns="" val="1"/>
               </a:ext>
             </a:extLst>
           </p:cNvPr>
@@ -10269,6 +10270,10 @@
               <a:rPr lang="pl-PL" err="1"/>
               <a:t>Całkowska</a:t>
             </a:r>
+            <a:r>
+              <a:rPr lang="pl-PL"/>
+              <a:t/>
+            </a:r>
             <a:br>
               <a:rPr lang="pl-PL"/>
             </a:br>
@@ -10287,7 +10292,7 @@
                 <a16:creationId xmlns:a16="http://schemas.microsoft.com/office/drawing/2014/main" id="{A7014575-F0CE-4EAB-917E-3325411BA231}"/>
               </a:ext>
               <a:ext uri="{C183D7F6-B498-43B3-948B-1728B52AA6E4}">
-                <adec:decorative xmlns:adec="http://schemas.microsoft.com/office/drawing/2017/decorative" val="1"/>
+                <adec:decorative xmlns:adec="http://schemas.microsoft.com/office/drawing/2017/decorative" xmlns="" val="1"/>
               </a:ext>
             </a:extLst>
           </p:cNvPr>
@@ -10318,7 +10323,7 @@
                   <a16:creationId xmlns:a16="http://schemas.microsoft.com/office/drawing/2014/main" id="{2DB3702B-264B-4A16-B3FF-E2B1366D5765}"/>
                 </a:ext>
                 <a:ext uri="{C183D7F6-B498-43B3-948B-1728B52AA6E4}">
-                  <adec:decorative xmlns:adec="http://schemas.microsoft.com/office/drawing/2017/decorative" val="1"/>
+                  <adec:decorative xmlns:adec="http://schemas.microsoft.com/office/drawing/2017/decorative" xmlns="" val="1"/>
                 </a:ext>
               </a:extLst>
             </p:cNvPr>
@@ -10386,7 +10391,7 @@
                   <a16:creationId xmlns:a16="http://schemas.microsoft.com/office/drawing/2014/main" id="{92A33E2F-6DB3-47D1-B577-F0D4289E8A38}"/>
                 </a:ext>
                 <a:ext uri="{C183D7F6-B498-43B3-948B-1728B52AA6E4}">
-                  <adec:decorative xmlns:adec="http://schemas.microsoft.com/office/drawing/2017/decorative" val="1"/>
+                  <adec:decorative xmlns:adec="http://schemas.microsoft.com/office/drawing/2017/decorative" xmlns="" val="1"/>
                 </a:ext>
               </a:extLst>
             </p:cNvPr>
@@ -10452,7 +10457,7 @@
                   <a16:creationId xmlns:a16="http://schemas.microsoft.com/office/drawing/2014/main" id="{A4F24FF8-D392-412B-AB34-A7D89311B017}"/>
                 </a:ext>
                 <a:ext uri="{C183D7F6-B498-43B3-948B-1728B52AA6E4}">
-                  <adec:decorative xmlns:adec="http://schemas.microsoft.com/office/drawing/2017/decorative" val="1"/>
+                  <adec:decorative xmlns:adec="http://schemas.microsoft.com/office/drawing/2017/decorative" xmlns="" val="1"/>
                 </a:ext>
               </a:extLst>
             </p:cNvPr>
@@ -10762,7 +10767,7 @@
                 <a16:creationId xmlns:a16="http://schemas.microsoft.com/office/drawing/2014/main" id="{BF4E480B-94D6-46F9-A2B6-B98D311FDC19}"/>
               </a:ext>
               <a:ext uri="{C183D7F6-B498-43B3-948B-1728B52AA6E4}">
-                <adec:decorative xmlns:adec="http://schemas.microsoft.com/office/drawing/2017/decorative" val="1"/>
+                <adec:decorative xmlns:adec="http://schemas.microsoft.com/office/drawing/2017/decorative" xmlns="" val="1"/>
               </a:ext>
             </a:extLst>
           </p:cNvPr>
@@ -10793,7 +10798,7 @@
                   <a16:creationId xmlns:a16="http://schemas.microsoft.com/office/drawing/2014/main" id="{07183CDE-91A1-40C3-8E80-66F89E1C2D53}"/>
                 </a:ext>
                 <a:ext uri="{C183D7F6-B498-43B3-948B-1728B52AA6E4}">
-                  <adec:decorative xmlns:adec="http://schemas.microsoft.com/office/drawing/2017/decorative" val="1"/>
+                  <adec:decorative xmlns:adec="http://schemas.microsoft.com/office/drawing/2017/decorative" xmlns="" val="1"/>
                 </a:ext>
               </a:extLst>
             </p:cNvPr>
@@ -10874,7 +10879,7 @@
                   <a16:creationId xmlns:a16="http://schemas.microsoft.com/office/drawing/2014/main" id="{A6756515-F9AA-46BD-8DD2-AA15BA492AC0}"/>
                 </a:ext>
                 <a:ext uri="{C183D7F6-B498-43B3-948B-1728B52AA6E4}">
-                  <adec:decorative xmlns:adec="http://schemas.microsoft.com/office/drawing/2017/decorative" val="1"/>
+                  <adec:decorative xmlns:adec="http://schemas.microsoft.com/office/drawing/2017/decorative" xmlns="" val="1"/>
                 </a:ext>
               </a:extLst>
             </p:cNvPr>
@@ -10942,7 +10947,7 @@
                   <a16:creationId xmlns:a16="http://schemas.microsoft.com/office/drawing/2014/main" id="{ABA365E2-8B71-408B-9092-0104216AC7AC}"/>
                 </a:ext>
                 <a:ext uri="{C183D7F6-B498-43B3-948B-1728B52AA6E4}">
-                  <adec:decorative xmlns:adec="http://schemas.microsoft.com/office/drawing/2017/decorative" val="1"/>
+                  <adec:decorative xmlns:adec="http://schemas.microsoft.com/office/drawing/2017/decorative" xmlns="" val="1"/>
                 </a:ext>
               </a:extLst>
             </p:cNvPr>
@@ -11010,7 +11015,7 @@
                   <a16:creationId xmlns:a16="http://schemas.microsoft.com/office/drawing/2014/main" id="{BEDB8D7A-1BF6-4CDB-B93A-7736955F5043}"/>
                 </a:ext>
                 <a:ext uri="{C183D7F6-B498-43B3-948B-1728B52AA6E4}">
-                  <adec:decorative xmlns:adec="http://schemas.microsoft.com/office/drawing/2017/decorative" val="1"/>
+                  <adec:decorative xmlns:adec="http://schemas.microsoft.com/office/drawing/2017/decorative" xmlns="" val="1"/>
                 </a:ext>
               </a:extLst>
             </p:cNvPr>
@@ -11041,7 +11046,7 @@
                     <a16:creationId xmlns:a16="http://schemas.microsoft.com/office/drawing/2014/main" id="{5AACD774-5167-46C7-8A62-6E2FE4BE9469}"/>
                   </a:ext>
                   <a:ext uri="{C183D7F6-B498-43B3-948B-1728B52AA6E4}">
-                    <adec:decorative xmlns:adec="http://schemas.microsoft.com/office/drawing/2017/decorative" val="1"/>
+                    <adec:decorative xmlns:adec="http://schemas.microsoft.com/office/drawing/2017/decorative" xmlns="" val="1"/>
                   </a:ext>
                 </a:extLst>
               </p:cNvPr>
@@ -11118,7 +11123,7 @@
                     <a16:creationId xmlns:a16="http://schemas.microsoft.com/office/drawing/2014/main" id="{06E0F2D8-452E-48F9-9912-C47EAEAE1802}"/>
                   </a:ext>
                   <a:ext uri="{C183D7F6-B498-43B3-948B-1728B52AA6E4}">
-                    <adec:decorative xmlns:adec="http://schemas.microsoft.com/office/drawing/2017/decorative" val="1"/>
+                    <adec:decorative xmlns:adec="http://schemas.microsoft.com/office/drawing/2017/decorative" xmlns="" val="1"/>
                   </a:ext>
                 </a:extLst>
               </p:cNvPr>
@@ -11196,7 +11201,7 @@
                   <a16:creationId xmlns:a16="http://schemas.microsoft.com/office/drawing/2014/main" id="{91FBBF95-430B-427C-A6E8-DB899217FC00}"/>
                 </a:ext>
                 <a:ext uri="{C183D7F6-B498-43B3-948B-1728B52AA6E4}">
-                  <adec:decorative xmlns:adec="http://schemas.microsoft.com/office/drawing/2017/decorative" val="1"/>
+                  <adec:decorative xmlns:adec="http://schemas.microsoft.com/office/drawing/2017/decorative" xmlns="" val="1"/>
                 </a:ext>
               </a:extLst>
             </p:cNvPr>
@@ -11227,7 +11232,7 @@
                     <a16:creationId xmlns:a16="http://schemas.microsoft.com/office/drawing/2014/main" id="{BEE64698-3ED2-4395-B7FC-65248E437E0A}"/>
                   </a:ext>
                   <a:ext uri="{C183D7F6-B498-43B3-948B-1728B52AA6E4}">
-                    <adec:decorative xmlns:adec="http://schemas.microsoft.com/office/drawing/2017/decorative" val="1"/>
+                    <adec:decorative xmlns:adec="http://schemas.microsoft.com/office/drawing/2017/decorative" xmlns="" val="1"/>
                   </a:ext>
                 </a:extLst>
               </p:cNvPr>
@@ -11304,7 +11309,7 @@
                     <a16:creationId xmlns:a16="http://schemas.microsoft.com/office/drawing/2014/main" id="{FE20B1E1-CE09-4C2A-A3FB-DB8026C54E98}"/>
                   </a:ext>
                   <a:ext uri="{C183D7F6-B498-43B3-948B-1728B52AA6E4}">
-                    <adec:decorative xmlns:adec="http://schemas.microsoft.com/office/drawing/2017/decorative" val="1"/>
+                    <adec:decorative xmlns:adec="http://schemas.microsoft.com/office/drawing/2017/decorative" xmlns="" val="1"/>
                   </a:ext>
                 </a:extLst>
               </p:cNvPr>
@@ -11382,7 +11387,7 @@
                   <a16:creationId xmlns:a16="http://schemas.microsoft.com/office/drawing/2014/main" id="{0CB2405B-A907-48B3-906A-FB3573C0B282}"/>
                 </a:ext>
                 <a:ext uri="{C183D7F6-B498-43B3-948B-1728B52AA6E4}">
-                  <adec:decorative xmlns:adec="http://schemas.microsoft.com/office/drawing/2017/decorative" val="1"/>
+                  <adec:decorative xmlns:adec="http://schemas.microsoft.com/office/drawing/2017/decorative" xmlns="" val="1"/>
                 </a:ext>
               </a:extLst>
             </p:cNvPr>
@@ -11462,7 +11467,7 @@
                 <a16:creationId xmlns:a16="http://schemas.microsoft.com/office/drawing/2014/main" id="{6DC8E2D9-6729-4614-8667-C1016D3182E4}"/>
               </a:ext>
               <a:ext uri="{C183D7F6-B498-43B3-948B-1728B52AA6E4}">
-                <adec:decorative xmlns:adec="http://schemas.microsoft.com/office/drawing/2017/decorative" val="1"/>
+                <adec:decorative xmlns:adec="http://schemas.microsoft.com/office/drawing/2017/decorative" xmlns="" val="1"/>
               </a:ext>
             </a:extLst>
           </p:cNvPr>
@@ -11530,7 +11535,7 @@
                 <a16:creationId xmlns:a16="http://schemas.microsoft.com/office/drawing/2014/main" id="{9C51935E-4A08-4AE4-8E13-F40CD3C4F1C4}"/>
               </a:ext>
               <a:ext uri="{C183D7F6-B498-43B3-948B-1728B52AA6E4}">
-                <adec:decorative xmlns:adec="http://schemas.microsoft.com/office/drawing/2017/decorative" val="1"/>
+                <adec:decorative xmlns:adec="http://schemas.microsoft.com/office/drawing/2017/decorative" xmlns="" val="1"/>
               </a:ext>
             </a:extLst>
           </p:cNvPr>
@@ -11681,7 +11686,7 @@
                 <a16:creationId xmlns:a16="http://schemas.microsoft.com/office/drawing/2014/main" id="{4B7AF231-444C-44D0-B791-BAFE395E36AC}"/>
               </a:ext>
               <a:ext uri="{C183D7F6-B498-43B3-948B-1728B52AA6E4}">
-                <adec:decorative xmlns:adec="http://schemas.microsoft.com/office/drawing/2017/decorative" val="1"/>
+                <adec:decorative xmlns:adec="http://schemas.microsoft.com/office/drawing/2017/decorative" xmlns="" val="1"/>
               </a:ext>
             </a:extLst>
           </p:cNvPr>
@@ -11712,7 +11717,7 @@
                   <a16:creationId xmlns:a16="http://schemas.microsoft.com/office/drawing/2014/main" id="{6152793A-5125-41FA-AEF6-96C5463D0A76}"/>
                 </a:ext>
                 <a:ext uri="{C183D7F6-B498-43B3-948B-1728B52AA6E4}">
-                  <adec:decorative xmlns:adec="http://schemas.microsoft.com/office/drawing/2017/decorative" val="1"/>
+                  <adec:decorative xmlns:adec="http://schemas.microsoft.com/office/drawing/2017/decorative" xmlns="" val="1"/>
                 </a:ext>
               </a:extLst>
             </p:cNvPr>
@@ -11780,7 +11785,7 @@
                   <a16:creationId xmlns:a16="http://schemas.microsoft.com/office/drawing/2014/main" id="{63C1632F-098D-4A05-B248-04B7ABFE0060}"/>
                 </a:ext>
                 <a:ext uri="{C183D7F6-B498-43B3-948B-1728B52AA6E4}">
-                  <adec:decorative xmlns:adec="http://schemas.microsoft.com/office/drawing/2017/decorative" val="1"/>
+                  <adec:decorative xmlns:adec="http://schemas.microsoft.com/office/drawing/2017/decorative" xmlns="" val="1"/>
                 </a:ext>
               </a:extLst>
             </p:cNvPr>
@@ -11846,7 +11851,7 @@
                   <a16:creationId xmlns:a16="http://schemas.microsoft.com/office/drawing/2014/main" id="{0A85C0F5-DDEB-454E-A0E4-B6F0FB4CAB12}"/>
                 </a:ext>
                 <a:ext uri="{C183D7F6-B498-43B3-948B-1728B52AA6E4}">
-                  <adec:decorative xmlns:adec="http://schemas.microsoft.com/office/drawing/2017/decorative" val="1"/>
+                  <adec:decorative xmlns:adec="http://schemas.microsoft.com/office/drawing/2017/decorative" xmlns="" val="1"/>
                 </a:ext>
               </a:extLst>
             </p:cNvPr>
@@ -12023,7 +12028,7 @@
                 <a16:creationId xmlns:a16="http://schemas.microsoft.com/office/drawing/2014/main" id="{BF4E480B-94D6-46F9-A2B6-B98D311FDC19}"/>
               </a:ext>
               <a:ext uri="{C183D7F6-B498-43B3-948B-1728B52AA6E4}">
-                <adec:decorative xmlns:adec="http://schemas.microsoft.com/office/drawing/2017/decorative" val="1"/>
+                <adec:decorative xmlns:adec="http://schemas.microsoft.com/office/drawing/2017/decorative" xmlns="" val="1"/>
               </a:ext>
             </a:extLst>
           </p:cNvPr>
@@ -12054,7 +12059,7 @@
                   <a16:creationId xmlns:a16="http://schemas.microsoft.com/office/drawing/2014/main" id="{07183CDE-91A1-40C3-8E80-66F89E1C2D53}"/>
                 </a:ext>
                 <a:ext uri="{C183D7F6-B498-43B3-948B-1728B52AA6E4}">
-                  <adec:decorative xmlns:adec="http://schemas.microsoft.com/office/drawing/2017/decorative" val="1"/>
+                  <adec:decorative xmlns:adec="http://schemas.microsoft.com/office/drawing/2017/decorative" xmlns="" val="1"/>
                 </a:ext>
               </a:extLst>
             </p:cNvPr>
@@ -12135,7 +12140,7 @@
                   <a16:creationId xmlns:a16="http://schemas.microsoft.com/office/drawing/2014/main" id="{A6756515-F9AA-46BD-8DD2-AA15BA492AC0}"/>
                 </a:ext>
                 <a:ext uri="{C183D7F6-B498-43B3-948B-1728B52AA6E4}">
-                  <adec:decorative xmlns:adec="http://schemas.microsoft.com/office/drawing/2017/decorative" val="1"/>
+                  <adec:decorative xmlns:adec="http://schemas.microsoft.com/office/drawing/2017/decorative" xmlns="" val="1"/>
                 </a:ext>
               </a:extLst>
             </p:cNvPr>
@@ -12203,7 +12208,7 @@
                   <a16:creationId xmlns:a16="http://schemas.microsoft.com/office/drawing/2014/main" id="{ABA365E2-8B71-408B-9092-0104216AC7AC}"/>
                 </a:ext>
                 <a:ext uri="{C183D7F6-B498-43B3-948B-1728B52AA6E4}">
-                  <adec:decorative xmlns:adec="http://schemas.microsoft.com/office/drawing/2017/decorative" val="1"/>
+                  <adec:decorative xmlns:adec="http://schemas.microsoft.com/office/drawing/2017/decorative" xmlns="" val="1"/>
                 </a:ext>
               </a:extLst>
             </p:cNvPr>
@@ -12271,7 +12276,7 @@
                   <a16:creationId xmlns:a16="http://schemas.microsoft.com/office/drawing/2014/main" id="{BEDB8D7A-1BF6-4CDB-B93A-7736955F5043}"/>
                 </a:ext>
                 <a:ext uri="{C183D7F6-B498-43B3-948B-1728B52AA6E4}">
-                  <adec:decorative xmlns:adec="http://schemas.microsoft.com/office/drawing/2017/decorative" val="1"/>
+                  <adec:decorative xmlns:adec="http://schemas.microsoft.com/office/drawing/2017/decorative" xmlns="" val="1"/>
                 </a:ext>
               </a:extLst>
             </p:cNvPr>
@@ -12302,7 +12307,7 @@
                     <a16:creationId xmlns:a16="http://schemas.microsoft.com/office/drawing/2014/main" id="{5AACD774-5167-46C7-8A62-6E2FE4BE9469}"/>
                   </a:ext>
                   <a:ext uri="{C183D7F6-B498-43B3-948B-1728B52AA6E4}">
-                    <adec:decorative xmlns:adec="http://schemas.microsoft.com/office/drawing/2017/decorative" val="1"/>
+                    <adec:decorative xmlns:adec="http://schemas.microsoft.com/office/drawing/2017/decorative" xmlns="" val="1"/>
                   </a:ext>
                 </a:extLst>
               </p:cNvPr>
@@ -12379,7 +12384,7 @@
                     <a16:creationId xmlns:a16="http://schemas.microsoft.com/office/drawing/2014/main" id="{06E0F2D8-452E-48F9-9912-C47EAEAE1802}"/>
                   </a:ext>
                   <a:ext uri="{C183D7F6-B498-43B3-948B-1728B52AA6E4}">
-                    <adec:decorative xmlns:adec="http://schemas.microsoft.com/office/drawing/2017/decorative" val="1"/>
+                    <adec:decorative xmlns:adec="http://schemas.microsoft.com/office/drawing/2017/decorative" xmlns="" val="1"/>
                   </a:ext>
                 </a:extLst>
               </p:cNvPr>
@@ -12457,7 +12462,7 @@
                   <a16:creationId xmlns:a16="http://schemas.microsoft.com/office/drawing/2014/main" id="{91FBBF95-430B-427C-A6E8-DB899217FC00}"/>
                 </a:ext>
                 <a:ext uri="{C183D7F6-B498-43B3-948B-1728B52AA6E4}">
-                  <adec:decorative xmlns:adec="http://schemas.microsoft.com/office/drawing/2017/decorative" val="1"/>
+                  <adec:decorative xmlns:adec="http://schemas.microsoft.com/office/drawing/2017/decorative" xmlns="" val="1"/>
                 </a:ext>
               </a:extLst>
             </p:cNvPr>
@@ -12488,7 +12493,7 @@
                     <a16:creationId xmlns:a16="http://schemas.microsoft.com/office/drawing/2014/main" id="{BEE64698-3ED2-4395-B7FC-65248E437E0A}"/>
                   </a:ext>
                   <a:ext uri="{C183D7F6-B498-43B3-948B-1728B52AA6E4}">
-                    <adec:decorative xmlns:adec="http://schemas.microsoft.com/office/drawing/2017/decorative" val="1"/>
+                    <adec:decorative xmlns:adec="http://schemas.microsoft.com/office/drawing/2017/decorative" xmlns="" val="1"/>
                   </a:ext>
                 </a:extLst>
               </p:cNvPr>
@@ -12565,7 +12570,7 @@
                     <a16:creationId xmlns:a16="http://schemas.microsoft.com/office/drawing/2014/main" id="{FE20B1E1-CE09-4C2A-A3FB-DB8026C54E98}"/>
                   </a:ext>
                   <a:ext uri="{C183D7F6-B498-43B3-948B-1728B52AA6E4}">
-                    <adec:decorative xmlns:adec="http://schemas.microsoft.com/office/drawing/2017/decorative" val="1"/>
+                    <adec:decorative xmlns:adec="http://schemas.microsoft.com/office/drawing/2017/decorative" xmlns="" val="1"/>
                   </a:ext>
                 </a:extLst>
               </p:cNvPr>
@@ -12643,7 +12648,7 @@
                   <a16:creationId xmlns:a16="http://schemas.microsoft.com/office/drawing/2014/main" id="{0CB2405B-A907-48B3-906A-FB3573C0B282}"/>
                 </a:ext>
                 <a:ext uri="{C183D7F6-B498-43B3-948B-1728B52AA6E4}">
-                  <adec:decorative xmlns:adec="http://schemas.microsoft.com/office/drawing/2017/decorative" val="1"/>
+                  <adec:decorative xmlns:adec="http://schemas.microsoft.com/office/drawing/2017/decorative" xmlns="" val="1"/>
                 </a:ext>
               </a:extLst>
             </p:cNvPr>
@@ -12723,7 +12728,7 @@
                 <a16:creationId xmlns:a16="http://schemas.microsoft.com/office/drawing/2014/main" id="{6DC8E2D9-6729-4614-8667-C1016D3182E4}"/>
               </a:ext>
               <a:ext uri="{C183D7F6-B498-43B3-948B-1728B52AA6E4}">
-                <adec:decorative xmlns:adec="http://schemas.microsoft.com/office/drawing/2017/decorative" val="1"/>
+                <adec:decorative xmlns:adec="http://schemas.microsoft.com/office/drawing/2017/decorative" xmlns="" val="1"/>
               </a:ext>
             </a:extLst>
           </p:cNvPr>
@@ -12791,7 +12796,7 @@
                 <a16:creationId xmlns:a16="http://schemas.microsoft.com/office/drawing/2014/main" id="{9C51935E-4A08-4AE4-8E13-F40CD3C4F1C4}"/>
               </a:ext>
               <a:ext uri="{C183D7F6-B498-43B3-948B-1728B52AA6E4}">
-                <adec:decorative xmlns:adec="http://schemas.microsoft.com/office/drawing/2017/decorative" val="1"/>
+                <adec:decorative xmlns:adec="http://schemas.microsoft.com/office/drawing/2017/decorative" xmlns="" val="1"/>
               </a:ext>
             </a:extLst>
           </p:cNvPr>
@@ -12942,7 +12947,7 @@
                 <a16:creationId xmlns:a16="http://schemas.microsoft.com/office/drawing/2014/main" id="{4B7AF231-444C-44D0-B791-BAFE395E36AC}"/>
               </a:ext>
               <a:ext uri="{C183D7F6-B498-43B3-948B-1728B52AA6E4}">
-                <adec:decorative xmlns:adec="http://schemas.microsoft.com/office/drawing/2017/decorative" val="1"/>
+                <adec:decorative xmlns:adec="http://schemas.microsoft.com/office/drawing/2017/decorative" xmlns="" val="1"/>
               </a:ext>
             </a:extLst>
           </p:cNvPr>
@@ -12973,7 +12978,7 @@
                   <a16:creationId xmlns:a16="http://schemas.microsoft.com/office/drawing/2014/main" id="{6152793A-5125-41FA-AEF6-96C5463D0A76}"/>
                 </a:ext>
                 <a:ext uri="{C183D7F6-B498-43B3-948B-1728B52AA6E4}">
-                  <adec:decorative xmlns:adec="http://schemas.microsoft.com/office/drawing/2017/decorative" val="1"/>
+                  <adec:decorative xmlns:adec="http://schemas.microsoft.com/office/drawing/2017/decorative" xmlns="" val="1"/>
                 </a:ext>
               </a:extLst>
             </p:cNvPr>
@@ -13041,7 +13046,7 @@
                   <a16:creationId xmlns:a16="http://schemas.microsoft.com/office/drawing/2014/main" id="{63C1632F-098D-4A05-B248-04B7ABFE0060}"/>
                 </a:ext>
                 <a:ext uri="{C183D7F6-B498-43B3-948B-1728B52AA6E4}">
-                  <adec:decorative xmlns:adec="http://schemas.microsoft.com/office/drawing/2017/decorative" val="1"/>
+                  <adec:decorative xmlns:adec="http://schemas.microsoft.com/office/drawing/2017/decorative" xmlns="" val="1"/>
                 </a:ext>
               </a:extLst>
             </p:cNvPr>
@@ -13107,7 +13112,7 @@
                   <a16:creationId xmlns:a16="http://schemas.microsoft.com/office/drawing/2014/main" id="{0A85C0F5-DDEB-454E-A0E4-B6F0FB4CAB12}"/>
                 </a:ext>
                 <a:ext uri="{C183D7F6-B498-43B3-948B-1728B52AA6E4}">
-                  <adec:decorative xmlns:adec="http://schemas.microsoft.com/office/drawing/2017/decorative" val="1"/>
+                  <adec:decorative xmlns:adec="http://schemas.microsoft.com/office/drawing/2017/decorative" xmlns="" val="1"/>
                 </a:ext>
               </a:extLst>
             </p:cNvPr>
@@ -13284,7 +13289,7 @@
                 <a16:creationId xmlns:a16="http://schemas.microsoft.com/office/drawing/2014/main" id="{81C8C0F4-5C44-4C3F-B321-5CB3E2BABC2C}"/>
               </a:ext>
               <a:ext uri="{C183D7F6-B498-43B3-948B-1728B52AA6E4}">
-                <adec:decorative xmlns:adec="http://schemas.microsoft.com/office/drawing/2017/decorative" val="1"/>
+                <adec:decorative xmlns:adec="http://schemas.microsoft.com/office/drawing/2017/decorative" xmlns="" val="1"/>
               </a:ext>
             </a:extLst>
           </p:cNvPr>
@@ -13465,7 +13470,7 @@
                 <a16:creationId xmlns:a16="http://schemas.microsoft.com/office/drawing/2014/main" id="{000A5F84-BD20-4A3E-81BA-9F4444101C16}"/>
               </a:ext>
               <a:ext uri="{C183D7F6-B498-43B3-948B-1728B52AA6E4}">
-                <adec:decorative xmlns:adec="http://schemas.microsoft.com/office/drawing/2017/decorative" val="1"/>
+                <adec:decorative xmlns:adec="http://schemas.microsoft.com/office/drawing/2017/decorative" xmlns="" val="1"/>
               </a:ext>
             </a:extLst>
           </p:cNvPr>
@@ -13496,7 +13501,7 @@
                   <a16:creationId xmlns:a16="http://schemas.microsoft.com/office/drawing/2014/main" id="{FF62F19C-23B5-44FC-88CF-01A430872686}"/>
                 </a:ext>
                 <a:ext uri="{C183D7F6-B498-43B3-948B-1728B52AA6E4}">
-                  <adec:decorative xmlns:adec="http://schemas.microsoft.com/office/drawing/2017/decorative" val="1"/>
+                  <adec:decorative xmlns:adec="http://schemas.microsoft.com/office/drawing/2017/decorative" xmlns="" val="1"/>
                 </a:ext>
               </a:extLst>
             </p:cNvPr>
@@ -13564,7 +13569,7 @@
                   <a16:creationId xmlns:a16="http://schemas.microsoft.com/office/drawing/2014/main" id="{C82D9667-DCFB-45CA-8EDC-7E5E0EE42AB3}"/>
                 </a:ext>
                 <a:ext uri="{C183D7F6-B498-43B3-948B-1728B52AA6E4}">
-                  <adec:decorative xmlns:adec="http://schemas.microsoft.com/office/drawing/2017/decorative" val="1"/>
+                  <adec:decorative xmlns:adec="http://schemas.microsoft.com/office/drawing/2017/decorative" xmlns="" val="1"/>
                 </a:ext>
               </a:extLst>
             </p:cNvPr>
@@ -13630,7 +13635,7 @@
                   <a16:creationId xmlns:a16="http://schemas.microsoft.com/office/drawing/2014/main" id="{CE8752FF-502D-43D5-9828-8C4216648319}"/>
                 </a:ext>
                 <a:ext uri="{C183D7F6-B498-43B3-948B-1728B52AA6E4}">
-                  <adec:decorative xmlns:adec="http://schemas.microsoft.com/office/drawing/2017/decorative" val="1"/>
+                  <adec:decorative xmlns:adec="http://schemas.microsoft.com/office/drawing/2017/decorative" xmlns="" val="1"/>
                 </a:ext>
               </a:extLst>
             </p:cNvPr>
@@ -13777,6 +13782,118 @@
 <file path=ppt/slides/slide13.xml><?xml version="1.0" encoding="utf-8"?>
 <p:sld xmlns:a="http://schemas.openxmlformats.org/drawingml/2006/main" xmlns:r="http://schemas.openxmlformats.org/officeDocument/2006/relationships" xmlns:p="http://schemas.openxmlformats.org/presentationml/2006/main">
   <p:cSld>
+    <p:spTree>
+      <p:nvGrpSpPr>
+        <p:cNvPr id="1" name=""/>
+        <p:cNvGrpSpPr/>
+        <p:nvPr/>
+      </p:nvGrpSpPr>
+      <p:grpSpPr>
+        <a:xfrm>
+          <a:off x="0" y="0"/>
+          <a:ext cx="0" cy="0"/>
+          <a:chOff x="0" y="0"/>
+          <a:chExt cx="0" cy="0"/>
+        </a:xfrm>
+      </p:grpSpPr>
+      <p:sp>
+        <p:nvSpPr>
+          <p:cNvPr id="2" name="Title 1"/>
+          <p:cNvSpPr>
+            <a:spLocks noGrp="1"/>
+          </p:cNvSpPr>
+          <p:nvPr>
+            <p:ph type="title"/>
+          </p:nvPr>
+        </p:nvSpPr>
+        <p:spPr/>
+        <p:txBody>
+          <a:bodyPr/>
+          <a:lstStyle/>
+          <a:p>
+            <a:r>
+              <a:rPr lang="pl-PL" dirty="0" smtClean="0"/>
+              <a:t>Licznik/suwak?</a:t>
+            </a:r>
+            <a:endParaRPr lang="pl-PL" dirty="0"/>
+          </a:p>
+        </p:txBody>
+      </p:sp>
+      <p:sp>
+        <p:nvSpPr>
+          <p:cNvPr id="3" name="Content Placeholder 2"/>
+          <p:cNvSpPr>
+            <a:spLocks noGrp="1"/>
+          </p:cNvSpPr>
+          <p:nvPr>
+            <p:ph idx="1"/>
+          </p:nvPr>
+        </p:nvSpPr>
+        <p:spPr/>
+        <p:txBody>
+          <a:bodyPr/>
+          <a:lstStyle/>
+          <a:p>
+            <a:r>
+              <a:rPr lang="pl-PL" dirty="0" err="1" smtClean="0"/>
+              <a:t>Postac</a:t>
+            </a:r>
+            <a:r>
+              <a:rPr lang="pl-PL" dirty="0" smtClean="0"/>
+              <a:t> z szerokiej na </a:t>
+            </a:r>
+            <a:r>
+              <a:rPr lang="pl-PL" dirty="0" err="1" smtClean="0"/>
+              <a:t>dluga</a:t>
+            </a:r>
+            <a:r>
+              <a:rPr lang="pl-PL" dirty="0" smtClean="0"/>
+              <a:t> pozwala na robienie </a:t>
+            </a:r>
+            <a:r>
+              <a:rPr lang="pl-PL" dirty="0" err="1" smtClean="0"/>
+              <a:t>wykresow</a:t>
+            </a:r>
+            <a:r>
+              <a:rPr lang="pl-PL" dirty="0" smtClean="0"/>
+              <a:t> obok siebie jednocześnie </a:t>
+            </a:r>
+            <a:r>
+              <a:rPr lang="pl-PL" dirty="0" err="1" smtClean="0"/>
+              <a:t>pivot</a:t>
+            </a:r>
+            <a:r>
+              <a:rPr lang="pl-PL" dirty="0" smtClean="0"/>
+              <a:t>(</a:t>
+            </a:r>
+            <a:r>
+              <a:rPr lang="pl-PL" dirty="0" err="1" smtClean="0"/>
+              <a:t>tidyr</a:t>
+            </a:r>
+            <a:r>
+              <a:rPr lang="pl-PL" dirty="0" smtClean="0"/>
+              <a:t>) facet</a:t>
+            </a:r>
+            <a:endParaRPr lang="pl-PL" dirty="0"/>
+          </a:p>
+        </p:txBody>
+      </p:sp>
+    </p:spTree>
+    <p:extLst>
+      <p:ext uri="{BB962C8B-B14F-4D97-AF65-F5344CB8AC3E}">
+        <p14:creationId xmlns:p14="http://schemas.microsoft.com/office/powerpoint/2010/main" val="250509526"/>
+      </p:ext>
+    </p:extLst>
+  </p:cSld>
+  <p:clrMapOvr>
+    <a:masterClrMapping/>
+  </p:clrMapOvr>
+</p:sld>
+</file>
+
+<file path=ppt/slides/slide14.xml><?xml version="1.0" encoding="utf-8"?>
+<p:sld xmlns:a="http://schemas.openxmlformats.org/drawingml/2006/main" xmlns:r="http://schemas.openxmlformats.org/officeDocument/2006/relationships" xmlns:p="http://schemas.openxmlformats.org/presentationml/2006/main">
+  <p:cSld>
     <p:bg>
       <p:bgPr>
         <a:solidFill>
@@ -13807,7 +13924,7 @@
                 <a16:creationId xmlns:a16="http://schemas.microsoft.com/office/drawing/2014/main" id="{5ED88E92-14F3-4B58-9E48-1D79E139A89E}"/>
               </a:ext>
               <a:ext uri="{C183D7F6-B498-43B3-948B-1728B52AA6E4}">
-                <adec:decorative xmlns:adec="http://schemas.microsoft.com/office/drawing/2017/decorative" val="1"/>
+                <adec:decorative xmlns:adec="http://schemas.microsoft.com/office/drawing/2017/decorative" xmlns="" val="1"/>
               </a:ext>
             </a:extLst>
           </p:cNvPr>
@@ -13838,7 +13955,7 @@
                   <a16:creationId xmlns:a16="http://schemas.microsoft.com/office/drawing/2014/main" id="{A6466AE7-32B6-4334-AF41-B9387E6726C5}"/>
                 </a:ext>
                 <a:ext uri="{C183D7F6-B498-43B3-948B-1728B52AA6E4}">
-                  <adec:decorative xmlns:adec="http://schemas.microsoft.com/office/drawing/2017/decorative" val="1"/>
+                  <adec:decorative xmlns:adec="http://schemas.microsoft.com/office/drawing/2017/decorative" xmlns="" val="1"/>
                 </a:ext>
               </a:extLst>
             </p:cNvPr>
@@ -13919,7 +14036,7 @@
                   <a16:creationId xmlns:a16="http://schemas.microsoft.com/office/drawing/2014/main" id="{659C09F8-90CD-443F-9AA1-D08C56A605BB}"/>
                 </a:ext>
                 <a:ext uri="{C183D7F6-B498-43B3-948B-1728B52AA6E4}">
-                  <adec:decorative xmlns:adec="http://schemas.microsoft.com/office/drawing/2017/decorative" val="1"/>
+                  <adec:decorative xmlns:adec="http://schemas.microsoft.com/office/drawing/2017/decorative" xmlns="" val="1"/>
                 </a:ext>
               </a:extLst>
             </p:cNvPr>
@@ -13987,7 +14104,7 @@
                   <a16:creationId xmlns:a16="http://schemas.microsoft.com/office/drawing/2014/main" id="{DC7304AB-BE7D-45AC-A876-4A24543AE5B3}"/>
                 </a:ext>
                 <a:ext uri="{C183D7F6-B498-43B3-948B-1728B52AA6E4}">
-                  <adec:decorative xmlns:adec="http://schemas.microsoft.com/office/drawing/2017/decorative" val="1"/>
+                  <adec:decorative xmlns:adec="http://schemas.microsoft.com/office/drawing/2017/decorative" xmlns="" val="1"/>
                 </a:ext>
               </a:extLst>
             </p:cNvPr>
@@ -14055,7 +14172,7 @@
                   <a16:creationId xmlns:a16="http://schemas.microsoft.com/office/drawing/2014/main" id="{8E11922B-DDB3-46D7-B1BD-C1CCDB3C42E3}"/>
                 </a:ext>
                 <a:ext uri="{C183D7F6-B498-43B3-948B-1728B52AA6E4}">
-                  <adec:decorative xmlns:adec="http://schemas.microsoft.com/office/drawing/2017/decorative" val="1"/>
+                  <adec:decorative xmlns:adec="http://schemas.microsoft.com/office/drawing/2017/decorative" xmlns="" val="1"/>
                 </a:ext>
               </a:extLst>
             </p:cNvPr>
@@ -14086,7 +14203,7 @@
                     <a16:creationId xmlns:a16="http://schemas.microsoft.com/office/drawing/2014/main" id="{C580F8F6-E662-4BCD-AC9C-7E5DDBD5A773}"/>
                   </a:ext>
                   <a:ext uri="{C183D7F6-B498-43B3-948B-1728B52AA6E4}">
-                    <adec:decorative xmlns:adec="http://schemas.microsoft.com/office/drawing/2017/decorative" val="1"/>
+                    <adec:decorative xmlns:adec="http://schemas.microsoft.com/office/drawing/2017/decorative" xmlns="" val="1"/>
                   </a:ext>
                 </a:extLst>
               </p:cNvPr>
@@ -14163,7 +14280,7 @@
                     <a16:creationId xmlns:a16="http://schemas.microsoft.com/office/drawing/2014/main" id="{9A333FE5-ADB0-48EE-A1A6-9AA36DA343A2}"/>
                   </a:ext>
                   <a:ext uri="{C183D7F6-B498-43B3-948B-1728B52AA6E4}">
-                    <adec:decorative xmlns:adec="http://schemas.microsoft.com/office/drawing/2017/decorative" val="1"/>
+                    <adec:decorative xmlns:adec="http://schemas.microsoft.com/office/drawing/2017/decorative" xmlns="" val="1"/>
                   </a:ext>
                 </a:extLst>
               </p:cNvPr>
@@ -14241,7 +14358,7 @@
                   <a16:creationId xmlns:a16="http://schemas.microsoft.com/office/drawing/2014/main" id="{0B09CD4F-6DF4-48AA-BD35-23E3F2A643F7}"/>
                 </a:ext>
                 <a:ext uri="{C183D7F6-B498-43B3-948B-1728B52AA6E4}">
-                  <adec:decorative xmlns:adec="http://schemas.microsoft.com/office/drawing/2017/decorative" val="1"/>
+                  <adec:decorative xmlns:adec="http://schemas.microsoft.com/office/drawing/2017/decorative" xmlns="" val="1"/>
                 </a:ext>
               </a:extLst>
             </p:cNvPr>
@@ -14272,7 +14389,7 @@
                     <a16:creationId xmlns:a16="http://schemas.microsoft.com/office/drawing/2014/main" id="{02223219-ACCC-42F2-A1B4-E3C8C8AB12A4}"/>
                   </a:ext>
                   <a:ext uri="{C183D7F6-B498-43B3-948B-1728B52AA6E4}">
-                    <adec:decorative xmlns:adec="http://schemas.microsoft.com/office/drawing/2017/decorative" val="1"/>
+                    <adec:decorative xmlns:adec="http://schemas.microsoft.com/office/drawing/2017/decorative" xmlns="" val="1"/>
                   </a:ext>
                 </a:extLst>
               </p:cNvPr>
@@ -14349,7 +14466,7 @@
                     <a16:creationId xmlns:a16="http://schemas.microsoft.com/office/drawing/2014/main" id="{1510B0E9-9BA0-4357-9E04-554C19BAAC89}"/>
                   </a:ext>
                   <a:ext uri="{C183D7F6-B498-43B3-948B-1728B52AA6E4}">
-                    <adec:decorative xmlns:adec="http://schemas.microsoft.com/office/drawing/2017/decorative" val="1"/>
+                    <adec:decorative xmlns:adec="http://schemas.microsoft.com/office/drawing/2017/decorative" xmlns="" val="1"/>
                   </a:ext>
                 </a:extLst>
               </p:cNvPr>
@@ -14427,7 +14544,7 @@
                   <a16:creationId xmlns:a16="http://schemas.microsoft.com/office/drawing/2014/main" id="{DF06DA80-525A-4C9E-A441-50630AA772A4}"/>
                 </a:ext>
                 <a:ext uri="{C183D7F6-B498-43B3-948B-1728B52AA6E4}">
-                  <adec:decorative xmlns:adec="http://schemas.microsoft.com/office/drawing/2017/decorative" val="1"/>
+                  <adec:decorative xmlns:adec="http://schemas.microsoft.com/office/drawing/2017/decorative" xmlns="" val="1"/>
                 </a:ext>
               </a:extLst>
             </p:cNvPr>
@@ -14507,7 +14624,7 @@
                 <a16:creationId xmlns:a16="http://schemas.microsoft.com/office/drawing/2014/main" id="{E841E027-8E53-4FEB-8605-2124D85731CA}"/>
               </a:ext>
               <a:ext uri="{C183D7F6-B498-43B3-948B-1728B52AA6E4}">
-                <adec:decorative xmlns:adec="http://schemas.microsoft.com/office/drawing/2017/decorative" val="1"/>
+                <adec:decorative xmlns:adec="http://schemas.microsoft.com/office/drawing/2017/decorative" xmlns="" val="1"/>
               </a:ext>
             </a:extLst>
           </p:cNvPr>
@@ -14671,7 +14788,7 @@
                 <a16:creationId xmlns:a16="http://schemas.microsoft.com/office/drawing/2014/main" id="{CA9CD3E6-968F-41B1-B6FA-C6FD9B728B6F}"/>
               </a:ext>
               <a:ext uri="{C183D7F6-B498-43B3-948B-1728B52AA6E4}">
-                <adec:decorative xmlns:adec="http://schemas.microsoft.com/office/drawing/2017/decorative" val="1"/>
+                <adec:decorative xmlns:adec="http://schemas.microsoft.com/office/drawing/2017/decorative" xmlns="" val="1"/>
               </a:ext>
             </a:extLst>
           </p:cNvPr>
@@ -15752,7 +15869,7 @@
                 <a16:creationId xmlns:a16="http://schemas.microsoft.com/office/drawing/2014/main" id="{2F76036C-C247-4F63-AE7F-2ADB1D496E70}"/>
               </a:ext>
               <a:ext uri="{C183D7F6-B498-43B3-948B-1728B52AA6E4}">
-                <adec:decorative xmlns:adec="http://schemas.microsoft.com/office/drawing/2017/decorative" val="1"/>
+                <adec:decorative xmlns:adec="http://schemas.microsoft.com/office/drawing/2017/decorative" xmlns="" val="1"/>
               </a:ext>
             </a:extLst>
           </p:cNvPr>
@@ -15783,7 +15900,7 @@
                   <a16:creationId xmlns:a16="http://schemas.microsoft.com/office/drawing/2014/main" id="{76E007C2-3152-4316-9102-D76C4E77FF14}"/>
                 </a:ext>
                 <a:ext uri="{C183D7F6-B498-43B3-948B-1728B52AA6E4}">
-                  <adec:decorative xmlns:adec="http://schemas.microsoft.com/office/drawing/2017/decorative" val="1"/>
+                  <adec:decorative xmlns:adec="http://schemas.microsoft.com/office/drawing/2017/decorative" xmlns="" val="1"/>
                 </a:ext>
               </a:extLst>
             </p:cNvPr>
@@ -15851,7 +15968,7 @@
                   <a16:creationId xmlns:a16="http://schemas.microsoft.com/office/drawing/2014/main" id="{097CD397-C9CD-43FA-ABEF-9C3530B00097}"/>
                 </a:ext>
                 <a:ext uri="{C183D7F6-B498-43B3-948B-1728B52AA6E4}">
-                  <adec:decorative xmlns:adec="http://schemas.microsoft.com/office/drawing/2017/decorative" val="1"/>
+                  <adec:decorative xmlns:adec="http://schemas.microsoft.com/office/drawing/2017/decorative" xmlns="" val="1"/>
                 </a:ext>
               </a:extLst>
             </p:cNvPr>
@@ -16072,7 +16189,7 @@
                 <a16:creationId xmlns:a16="http://schemas.microsoft.com/office/drawing/2014/main" id="{CA9CD3E6-968F-41B1-B6FA-C6FD9B728B6F}"/>
               </a:ext>
               <a:ext uri="{C183D7F6-B498-43B3-948B-1728B52AA6E4}">
-                <adec:decorative xmlns:adec="http://schemas.microsoft.com/office/drawing/2017/decorative" val="1"/>
+                <adec:decorative xmlns:adec="http://schemas.microsoft.com/office/drawing/2017/decorative" xmlns="" val="1"/>
               </a:ext>
             </a:extLst>
           </p:cNvPr>
@@ -16605,7 +16722,7 @@
                 <a16:creationId xmlns:a16="http://schemas.microsoft.com/office/drawing/2014/main" id="{2F76036C-C247-4F63-AE7F-2ADB1D496E70}"/>
               </a:ext>
               <a:ext uri="{C183D7F6-B498-43B3-948B-1728B52AA6E4}">
-                <adec:decorative xmlns:adec="http://schemas.microsoft.com/office/drawing/2017/decorative" val="1"/>
+                <adec:decorative xmlns:adec="http://schemas.microsoft.com/office/drawing/2017/decorative" xmlns="" val="1"/>
               </a:ext>
             </a:extLst>
           </p:cNvPr>
@@ -16636,7 +16753,7 @@
                   <a16:creationId xmlns:a16="http://schemas.microsoft.com/office/drawing/2014/main" id="{76E007C2-3152-4316-9102-D76C4E77FF14}"/>
                 </a:ext>
                 <a:ext uri="{C183D7F6-B498-43B3-948B-1728B52AA6E4}">
-                  <adec:decorative xmlns:adec="http://schemas.microsoft.com/office/drawing/2017/decorative" val="1"/>
+                  <adec:decorative xmlns:adec="http://schemas.microsoft.com/office/drawing/2017/decorative" xmlns="" val="1"/>
                 </a:ext>
               </a:extLst>
             </p:cNvPr>
@@ -16704,7 +16821,7 @@
                   <a16:creationId xmlns:a16="http://schemas.microsoft.com/office/drawing/2014/main" id="{097CD397-C9CD-43FA-ABEF-9C3530B00097}"/>
                 </a:ext>
                 <a:ext uri="{C183D7F6-B498-43B3-948B-1728B52AA6E4}">
-                  <adec:decorative xmlns:adec="http://schemas.microsoft.com/office/drawing/2017/decorative" val="1"/>
+                  <adec:decorative xmlns:adec="http://schemas.microsoft.com/office/drawing/2017/decorative" xmlns="" val="1"/>
                 </a:ext>
               </a:extLst>
             </p:cNvPr>
@@ -16875,7 +16992,7 @@
                 <a16:creationId xmlns:a16="http://schemas.microsoft.com/office/drawing/2014/main" id="{81C8C0F4-5C44-4C3F-B321-5CB3E2BABC2C}"/>
               </a:ext>
               <a:ext uri="{C183D7F6-B498-43B3-948B-1728B52AA6E4}">
-                <adec:decorative xmlns:adec="http://schemas.microsoft.com/office/drawing/2017/decorative" val="1"/>
+                <adec:decorative xmlns:adec="http://schemas.microsoft.com/office/drawing/2017/decorative" xmlns="" val="1"/>
               </a:ext>
             </a:extLst>
           </p:cNvPr>
@@ -16951,7 +17068,7 @@
                 <a16:creationId xmlns:a16="http://schemas.microsoft.com/office/drawing/2014/main" id="{987A62DB-71D7-497D-BE1C-933ECB515A68}"/>
               </a:ext>
               <a:ext uri="{C183D7F6-B498-43B3-948B-1728B52AA6E4}">
-                <adec:decorative xmlns:adec="http://schemas.microsoft.com/office/drawing/2017/decorative" val="1"/>
+                <adec:decorative xmlns:adec="http://schemas.microsoft.com/office/drawing/2017/decorative" xmlns="" val="1"/>
               </a:ext>
             </a:extLst>
           </p:cNvPr>
@@ -16982,7 +17099,7 @@
                   <a16:creationId xmlns:a16="http://schemas.microsoft.com/office/drawing/2014/main" id="{FDAC2767-A7E3-4697-90F6-443A58314030}"/>
                 </a:ext>
                 <a:ext uri="{C183D7F6-B498-43B3-948B-1728B52AA6E4}">
-                  <adec:decorative xmlns:adec="http://schemas.microsoft.com/office/drawing/2017/decorative" val="1"/>
+                  <adec:decorative xmlns:adec="http://schemas.microsoft.com/office/drawing/2017/decorative" xmlns="" val="1"/>
                 </a:ext>
               </a:extLst>
             </p:cNvPr>
@@ -17050,7 +17167,7 @@
                   <a16:creationId xmlns:a16="http://schemas.microsoft.com/office/drawing/2014/main" id="{AB23E396-A746-411A-8709-32ABC4DDEAAC}"/>
                 </a:ext>
                 <a:ext uri="{C183D7F6-B498-43B3-948B-1728B52AA6E4}">
-                  <adec:decorative xmlns:adec="http://schemas.microsoft.com/office/drawing/2017/decorative" val="1"/>
+                  <adec:decorative xmlns:adec="http://schemas.microsoft.com/office/drawing/2017/decorative" xmlns="" val="1"/>
                 </a:ext>
               </a:extLst>
             </p:cNvPr>
@@ -17116,7 +17233,7 @@
                   <a16:creationId xmlns:a16="http://schemas.microsoft.com/office/drawing/2014/main" id="{D135C986-CB82-4211-A910-D232B9BCA1E0}"/>
                 </a:ext>
                 <a:ext uri="{C183D7F6-B498-43B3-948B-1728B52AA6E4}">
-                  <adec:decorative xmlns:adec="http://schemas.microsoft.com/office/drawing/2017/decorative" val="1"/>
+                  <adec:decorative xmlns:adec="http://schemas.microsoft.com/office/drawing/2017/decorative" xmlns="" val="1"/>
                 </a:ext>
               </a:extLst>
             </p:cNvPr>
@@ -17185,7 +17302,7 @@
                 <a16:creationId xmlns:a16="http://schemas.microsoft.com/office/drawing/2014/main" id="{837F2C8F-CC11-4A18-AA7E-AE8C022CDCC8}"/>
               </a:ext>
               <a:ext uri="{C183D7F6-B498-43B3-948B-1728B52AA6E4}">
-                <adec:decorative xmlns:adec="http://schemas.microsoft.com/office/drawing/2017/decorative" val="1"/>
+                <adec:decorative xmlns:adec="http://schemas.microsoft.com/office/drawing/2017/decorative" xmlns="" val="1"/>
               </a:ext>
             </a:extLst>
           </p:cNvPr>
@@ -17459,7 +17576,7 @@
                 <a14:useLocalDpi xmlns:a14="http://schemas.microsoft.com/office/drawing/2010/main" val="0"/>
               </a:ext>
               <a:ext uri="{96DAC541-7B7A-43D3-8B79-37D633B846F1}">
-                <asvg:svgBlip xmlns:asvg="http://schemas.microsoft.com/office/drawing/2016/SVG/main" r:embed="rId3"/>
+                <asvg:svgBlip xmlns:asvg="http://schemas.microsoft.com/office/drawing/2016/SVG/main" xmlns="" r:embed="rId3"/>
               </a:ext>
             </a:extLst>
           </a:blip>
@@ -17523,7 +17640,7 @@
                 <a16:creationId xmlns:a16="http://schemas.microsoft.com/office/drawing/2014/main" id="{CA9CD3E6-968F-41B1-B6FA-C6FD9B728B6F}"/>
               </a:ext>
               <a:ext uri="{C183D7F6-B498-43B3-948B-1728B52AA6E4}">
-                <adec:decorative xmlns:adec="http://schemas.microsoft.com/office/drawing/2017/decorative" val="1"/>
+                <adec:decorative xmlns:adec="http://schemas.microsoft.com/office/drawing/2017/decorative" xmlns="" val="1"/>
               </a:ext>
             </a:extLst>
           </p:cNvPr>
@@ -18558,7 +18675,7 @@
                 <a16:creationId xmlns:a16="http://schemas.microsoft.com/office/drawing/2014/main" id="{2F76036C-C247-4F63-AE7F-2ADB1D496E70}"/>
               </a:ext>
               <a:ext uri="{C183D7F6-B498-43B3-948B-1728B52AA6E4}">
-                <adec:decorative xmlns:adec="http://schemas.microsoft.com/office/drawing/2017/decorative" val="1"/>
+                <adec:decorative xmlns:adec="http://schemas.microsoft.com/office/drawing/2017/decorative" xmlns="" val="1"/>
               </a:ext>
             </a:extLst>
           </p:cNvPr>
@@ -18589,7 +18706,7 @@
                   <a16:creationId xmlns:a16="http://schemas.microsoft.com/office/drawing/2014/main" id="{76E007C2-3152-4316-9102-D76C4E77FF14}"/>
                 </a:ext>
                 <a:ext uri="{C183D7F6-B498-43B3-948B-1728B52AA6E4}">
-                  <adec:decorative xmlns:adec="http://schemas.microsoft.com/office/drawing/2017/decorative" val="1"/>
+                  <adec:decorative xmlns:adec="http://schemas.microsoft.com/office/drawing/2017/decorative" xmlns="" val="1"/>
                 </a:ext>
               </a:extLst>
             </p:cNvPr>
@@ -18657,7 +18774,7 @@
                   <a16:creationId xmlns:a16="http://schemas.microsoft.com/office/drawing/2014/main" id="{097CD397-C9CD-43FA-ABEF-9C3530B00097}"/>
                 </a:ext>
                 <a:ext uri="{C183D7F6-B498-43B3-948B-1728B52AA6E4}">
-                  <adec:decorative xmlns:adec="http://schemas.microsoft.com/office/drawing/2017/decorative" val="1"/>
+                  <adec:decorative xmlns:adec="http://schemas.microsoft.com/office/drawing/2017/decorative" xmlns="" val="1"/>
                 </a:ext>
               </a:extLst>
             </p:cNvPr>
@@ -18828,7 +18945,7 @@
                 <a16:creationId xmlns:a16="http://schemas.microsoft.com/office/drawing/2014/main" id="{BF4E480B-94D6-46F9-A2B6-B98D311FDC19}"/>
               </a:ext>
               <a:ext uri="{C183D7F6-B498-43B3-948B-1728B52AA6E4}">
-                <adec:decorative xmlns:adec="http://schemas.microsoft.com/office/drawing/2017/decorative" val="1"/>
+                <adec:decorative xmlns:adec="http://schemas.microsoft.com/office/drawing/2017/decorative" xmlns="" val="1"/>
               </a:ext>
             </a:extLst>
           </p:cNvPr>
@@ -18859,7 +18976,7 @@
                   <a16:creationId xmlns:a16="http://schemas.microsoft.com/office/drawing/2014/main" id="{07183CDE-91A1-40C3-8E80-66F89E1C2D53}"/>
                 </a:ext>
                 <a:ext uri="{C183D7F6-B498-43B3-948B-1728B52AA6E4}">
-                  <adec:decorative xmlns:adec="http://schemas.microsoft.com/office/drawing/2017/decorative" val="1"/>
+                  <adec:decorative xmlns:adec="http://schemas.microsoft.com/office/drawing/2017/decorative" xmlns="" val="1"/>
                 </a:ext>
               </a:extLst>
             </p:cNvPr>
@@ -18940,7 +19057,7 @@
                   <a16:creationId xmlns:a16="http://schemas.microsoft.com/office/drawing/2014/main" id="{A6756515-F9AA-46BD-8DD2-AA15BA492AC0}"/>
                 </a:ext>
                 <a:ext uri="{C183D7F6-B498-43B3-948B-1728B52AA6E4}">
-                  <adec:decorative xmlns:adec="http://schemas.microsoft.com/office/drawing/2017/decorative" val="1"/>
+                  <adec:decorative xmlns:adec="http://schemas.microsoft.com/office/drawing/2017/decorative" xmlns="" val="1"/>
                 </a:ext>
               </a:extLst>
             </p:cNvPr>
@@ -19008,7 +19125,7 @@
                   <a16:creationId xmlns:a16="http://schemas.microsoft.com/office/drawing/2014/main" id="{ABA365E2-8B71-408B-9092-0104216AC7AC}"/>
                 </a:ext>
                 <a:ext uri="{C183D7F6-B498-43B3-948B-1728B52AA6E4}">
-                  <adec:decorative xmlns:adec="http://schemas.microsoft.com/office/drawing/2017/decorative" val="1"/>
+                  <adec:decorative xmlns:adec="http://schemas.microsoft.com/office/drawing/2017/decorative" xmlns="" val="1"/>
                 </a:ext>
               </a:extLst>
             </p:cNvPr>
@@ -19076,7 +19193,7 @@
                   <a16:creationId xmlns:a16="http://schemas.microsoft.com/office/drawing/2014/main" id="{BEDB8D7A-1BF6-4CDB-B93A-7736955F5043}"/>
                 </a:ext>
                 <a:ext uri="{C183D7F6-B498-43B3-948B-1728B52AA6E4}">
-                  <adec:decorative xmlns:adec="http://schemas.microsoft.com/office/drawing/2017/decorative" val="1"/>
+                  <adec:decorative xmlns:adec="http://schemas.microsoft.com/office/drawing/2017/decorative" xmlns="" val="1"/>
                 </a:ext>
               </a:extLst>
             </p:cNvPr>
@@ -19107,7 +19224,7 @@
                     <a16:creationId xmlns:a16="http://schemas.microsoft.com/office/drawing/2014/main" id="{5AACD774-5167-46C7-8A62-6E2FE4BE9469}"/>
                   </a:ext>
                   <a:ext uri="{C183D7F6-B498-43B3-948B-1728B52AA6E4}">
-                    <adec:decorative xmlns:adec="http://schemas.microsoft.com/office/drawing/2017/decorative" val="1"/>
+                    <adec:decorative xmlns:adec="http://schemas.microsoft.com/office/drawing/2017/decorative" xmlns="" val="1"/>
                   </a:ext>
                 </a:extLst>
               </p:cNvPr>
@@ -19184,7 +19301,7 @@
                     <a16:creationId xmlns:a16="http://schemas.microsoft.com/office/drawing/2014/main" id="{06E0F2D8-452E-48F9-9912-C47EAEAE1802}"/>
                   </a:ext>
                   <a:ext uri="{C183D7F6-B498-43B3-948B-1728B52AA6E4}">
-                    <adec:decorative xmlns:adec="http://schemas.microsoft.com/office/drawing/2017/decorative" val="1"/>
+                    <adec:decorative xmlns:adec="http://schemas.microsoft.com/office/drawing/2017/decorative" xmlns="" val="1"/>
                   </a:ext>
                 </a:extLst>
               </p:cNvPr>
@@ -19262,7 +19379,7 @@
                   <a16:creationId xmlns:a16="http://schemas.microsoft.com/office/drawing/2014/main" id="{91FBBF95-430B-427C-A6E8-DB899217FC00}"/>
                 </a:ext>
                 <a:ext uri="{C183D7F6-B498-43B3-948B-1728B52AA6E4}">
-                  <adec:decorative xmlns:adec="http://schemas.microsoft.com/office/drawing/2017/decorative" val="1"/>
+                  <adec:decorative xmlns:adec="http://schemas.microsoft.com/office/drawing/2017/decorative" xmlns="" val="1"/>
                 </a:ext>
               </a:extLst>
             </p:cNvPr>
@@ -19293,7 +19410,7 @@
                     <a16:creationId xmlns:a16="http://schemas.microsoft.com/office/drawing/2014/main" id="{BEE64698-3ED2-4395-B7FC-65248E437E0A}"/>
                   </a:ext>
                   <a:ext uri="{C183D7F6-B498-43B3-948B-1728B52AA6E4}">
-                    <adec:decorative xmlns:adec="http://schemas.microsoft.com/office/drawing/2017/decorative" val="1"/>
+                    <adec:decorative xmlns:adec="http://schemas.microsoft.com/office/drawing/2017/decorative" xmlns="" val="1"/>
                   </a:ext>
                 </a:extLst>
               </p:cNvPr>
@@ -19370,7 +19487,7 @@
                     <a16:creationId xmlns:a16="http://schemas.microsoft.com/office/drawing/2014/main" id="{FE20B1E1-CE09-4C2A-A3FB-DB8026C54E98}"/>
                   </a:ext>
                   <a:ext uri="{C183D7F6-B498-43B3-948B-1728B52AA6E4}">
-                    <adec:decorative xmlns:adec="http://schemas.microsoft.com/office/drawing/2017/decorative" val="1"/>
+                    <adec:decorative xmlns:adec="http://schemas.microsoft.com/office/drawing/2017/decorative" xmlns="" val="1"/>
                   </a:ext>
                 </a:extLst>
               </p:cNvPr>
@@ -19448,7 +19565,7 @@
                   <a16:creationId xmlns:a16="http://schemas.microsoft.com/office/drawing/2014/main" id="{0CB2405B-A907-48B3-906A-FB3573C0B282}"/>
                 </a:ext>
                 <a:ext uri="{C183D7F6-B498-43B3-948B-1728B52AA6E4}">
-                  <adec:decorative xmlns:adec="http://schemas.microsoft.com/office/drawing/2017/decorative" val="1"/>
+                  <adec:decorative xmlns:adec="http://schemas.microsoft.com/office/drawing/2017/decorative" xmlns="" val="1"/>
                 </a:ext>
               </a:extLst>
             </p:cNvPr>
@@ -19528,7 +19645,7 @@
                 <a16:creationId xmlns:a16="http://schemas.microsoft.com/office/drawing/2014/main" id="{6DC8E2D9-6729-4614-8667-C1016D3182E4}"/>
               </a:ext>
               <a:ext uri="{C183D7F6-B498-43B3-948B-1728B52AA6E4}">
-                <adec:decorative xmlns:adec="http://schemas.microsoft.com/office/drawing/2017/decorative" val="1"/>
+                <adec:decorative xmlns:adec="http://schemas.microsoft.com/office/drawing/2017/decorative" xmlns="" val="1"/>
               </a:ext>
             </a:extLst>
           </p:cNvPr>
@@ -19596,7 +19713,7 @@
                 <a16:creationId xmlns:a16="http://schemas.microsoft.com/office/drawing/2014/main" id="{9C51935E-4A08-4AE4-8E13-F40CD3C4F1C4}"/>
               </a:ext>
               <a:ext uri="{C183D7F6-B498-43B3-948B-1728B52AA6E4}">
-                <adec:decorative xmlns:adec="http://schemas.microsoft.com/office/drawing/2017/decorative" val="1"/>
+                <adec:decorative xmlns:adec="http://schemas.microsoft.com/office/drawing/2017/decorative" xmlns="" val="1"/>
               </a:ext>
             </a:extLst>
           </p:cNvPr>
@@ -19718,7 +19835,7 @@
                 <a16:creationId xmlns:a16="http://schemas.microsoft.com/office/drawing/2014/main" id="{4B7AF231-444C-44D0-B791-BAFE395E36AC}"/>
               </a:ext>
               <a:ext uri="{C183D7F6-B498-43B3-948B-1728B52AA6E4}">
-                <adec:decorative xmlns:adec="http://schemas.microsoft.com/office/drawing/2017/decorative" val="1"/>
+                <adec:decorative xmlns:adec="http://schemas.microsoft.com/office/drawing/2017/decorative" xmlns="" val="1"/>
               </a:ext>
             </a:extLst>
           </p:cNvPr>
@@ -19749,7 +19866,7 @@
                   <a16:creationId xmlns:a16="http://schemas.microsoft.com/office/drawing/2014/main" id="{6152793A-5125-41FA-AEF6-96C5463D0A76}"/>
                 </a:ext>
                 <a:ext uri="{C183D7F6-B498-43B3-948B-1728B52AA6E4}">
-                  <adec:decorative xmlns:adec="http://schemas.microsoft.com/office/drawing/2017/decorative" val="1"/>
+                  <adec:decorative xmlns:adec="http://schemas.microsoft.com/office/drawing/2017/decorative" xmlns="" val="1"/>
                 </a:ext>
               </a:extLst>
             </p:cNvPr>
@@ -19817,7 +19934,7 @@
                   <a16:creationId xmlns:a16="http://schemas.microsoft.com/office/drawing/2014/main" id="{63C1632F-098D-4A05-B248-04B7ABFE0060}"/>
                 </a:ext>
                 <a:ext uri="{C183D7F6-B498-43B3-948B-1728B52AA6E4}">
-                  <adec:decorative xmlns:adec="http://schemas.microsoft.com/office/drawing/2017/decorative" val="1"/>
+                  <adec:decorative xmlns:adec="http://schemas.microsoft.com/office/drawing/2017/decorative" xmlns="" val="1"/>
                 </a:ext>
               </a:extLst>
             </p:cNvPr>
@@ -19883,7 +20000,7 @@
                   <a16:creationId xmlns:a16="http://schemas.microsoft.com/office/drawing/2014/main" id="{0A85C0F5-DDEB-454E-A0E4-B6F0FB4CAB12}"/>
                 </a:ext>
                 <a:ext uri="{C183D7F6-B498-43B3-948B-1728B52AA6E4}">
-                  <adec:decorative xmlns:adec="http://schemas.microsoft.com/office/drawing/2017/decorative" val="1"/>
+                  <adec:decorative xmlns:adec="http://schemas.microsoft.com/office/drawing/2017/decorative" xmlns="" val="1"/>
                 </a:ext>
               </a:extLst>
             </p:cNvPr>
@@ -20146,7 +20263,7 @@
                 <a16:creationId xmlns:a16="http://schemas.microsoft.com/office/drawing/2014/main" id="{81C8C0F4-5C44-4C3F-B321-5CB3E2BABC2C}"/>
               </a:ext>
               <a:ext uri="{C183D7F6-B498-43B3-948B-1728B52AA6E4}">
-                <adec:decorative xmlns:adec="http://schemas.microsoft.com/office/drawing/2017/decorative" val="1"/>
+                <adec:decorative xmlns:adec="http://schemas.microsoft.com/office/drawing/2017/decorative" xmlns="" val="1"/>
               </a:ext>
             </a:extLst>
           </p:cNvPr>
@@ -20333,7 +20450,7 @@
                 <a16:creationId xmlns:a16="http://schemas.microsoft.com/office/drawing/2014/main" id="{000A5F84-BD20-4A3E-81BA-9F4444101C16}"/>
               </a:ext>
               <a:ext uri="{C183D7F6-B498-43B3-948B-1728B52AA6E4}">
-                <adec:decorative xmlns:adec="http://schemas.microsoft.com/office/drawing/2017/decorative" val="1"/>
+                <adec:decorative xmlns:adec="http://schemas.microsoft.com/office/drawing/2017/decorative" xmlns="" val="1"/>
               </a:ext>
             </a:extLst>
           </p:cNvPr>
@@ -20364,7 +20481,7 @@
                   <a16:creationId xmlns:a16="http://schemas.microsoft.com/office/drawing/2014/main" id="{FF62F19C-23B5-44FC-88CF-01A430872686}"/>
                 </a:ext>
                 <a:ext uri="{C183D7F6-B498-43B3-948B-1728B52AA6E4}">
-                  <adec:decorative xmlns:adec="http://schemas.microsoft.com/office/drawing/2017/decorative" val="1"/>
+                  <adec:decorative xmlns:adec="http://schemas.microsoft.com/office/drawing/2017/decorative" xmlns="" val="1"/>
                 </a:ext>
               </a:extLst>
             </p:cNvPr>
@@ -20432,7 +20549,7 @@
                   <a16:creationId xmlns:a16="http://schemas.microsoft.com/office/drawing/2014/main" id="{C82D9667-DCFB-45CA-8EDC-7E5E0EE42AB3}"/>
                 </a:ext>
                 <a:ext uri="{C183D7F6-B498-43B3-948B-1728B52AA6E4}">
-                  <adec:decorative xmlns:adec="http://schemas.microsoft.com/office/drawing/2017/decorative" val="1"/>
+                  <adec:decorative xmlns:adec="http://schemas.microsoft.com/office/drawing/2017/decorative" xmlns="" val="1"/>
                 </a:ext>
               </a:extLst>
             </p:cNvPr>
@@ -20498,7 +20615,7 @@
                   <a16:creationId xmlns:a16="http://schemas.microsoft.com/office/drawing/2014/main" id="{CE8752FF-502D-43D5-9828-8C4216648319}"/>
                 </a:ext>
                 <a:ext uri="{C183D7F6-B498-43B3-948B-1728B52AA6E4}">
-                  <adec:decorative xmlns:adec="http://schemas.microsoft.com/office/drawing/2017/decorative" val="1"/>
+                  <adec:decorative xmlns:adec="http://schemas.microsoft.com/office/drawing/2017/decorative" xmlns="" val="1"/>
                 </a:ext>
               </a:extLst>
             </p:cNvPr>
@@ -20675,7 +20792,7 @@
                 <a16:creationId xmlns:a16="http://schemas.microsoft.com/office/drawing/2014/main" id="{81C8C0F4-5C44-4C3F-B321-5CB3E2BABC2C}"/>
               </a:ext>
               <a:ext uri="{C183D7F6-B498-43B3-948B-1728B52AA6E4}">
-                <adec:decorative xmlns:adec="http://schemas.microsoft.com/office/drawing/2017/decorative" val="1"/>
+                <adec:decorative xmlns:adec="http://schemas.microsoft.com/office/drawing/2017/decorative" xmlns="" val="1"/>
               </a:ext>
             </a:extLst>
           </p:cNvPr>
@@ -20804,7 +20921,7 @@
         </p:spPr>
         <p:txBody>
           <a:bodyPr anchor="t">
-            <a:normAutofit fontScale="92500"/>
+            <a:normAutofit lnSpcReduction="10000"/>
           </a:bodyPr>
           <a:lstStyle/>
           <a:p>
@@ -20875,7 +20992,7 @@
                 <a16:creationId xmlns:a16="http://schemas.microsoft.com/office/drawing/2014/main" id="{000A5F84-BD20-4A3E-81BA-9F4444101C16}"/>
               </a:ext>
               <a:ext uri="{C183D7F6-B498-43B3-948B-1728B52AA6E4}">
-                <adec:decorative xmlns:adec="http://schemas.microsoft.com/office/drawing/2017/decorative" val="1"/>
+                <adec:decorative xmlns:adec="http://schemas.microsoft.com/office/drawing/2017/decorative" xmlns="" val="1"/>
               </a:ext>
             </a:extLst>
           </p:cNvPr>
@@ -20906,7 +21023,7 @@
                   <a16:creationId xmlns:a16="http://schemas.microsoft.com/office/drawing/2014/main" id="{FF62F19C-23B5-44FC-88CF-01A430872686}"/>
                 </a:ext>
                 <a:ext uri="{C183D7F6-B498-43B3-948B-1728B52AA6E4}">
-                  <adec:decorative xmlns:adec="http://schemas.microsoft.com/office/drawing/2017/decorative" val="1"/>
+                  <adec:decorative xmlns:adec="http://schemas.microsoft.com/office/drawing/2017/decorative" xmlns="" val="1"/>
                 </a:ext>
               </a:extLst>
             </p:cNvPr>
@@ -20974,7 +21091,7 @@
                   <a16:creationId xmlns:a16="http://schemas.microsoft.com/office/drawing/2014/main" id="{C82D9667-DCFB-45CA-8EDC-7E5E0EE42AB3}"/>
                 </a:ext>
                 <a:ext uri="{C183D7F6-B498-43B3-948B-1728B52AA6E4}">
-                  <adec:decorative xmlns:adec="http://schemas.microsoft.com/office/drawing/2017/decorative" val="1"/>
+                  <adec:decorative xmlns:adec="http://schemas.microsoft.com/office/drawing/2017/decorative" xmlns="" val="1"/>
                 </a:ext>
               </a:extLst>
             </p:cNvPr>
@@ -21040,7 +21157,7 @@
                   <a16:creationId xmlns:a16="http://schemas.microsoft.com/office/drawing/2014/main" id="{CE8752FF-502D-43D5-9828-8C4216648319}"/>
                 </a:ext>
                 <a:ext uri="{C183D7F6-B498-43B3-948B-1728B52AA6E4}">
-                  <adec:decorative xmlns:adec="http://schemas.microsoft.com/office/drawing/2017/decorative" val="1"/>
+                  <adec:decorative xmlns:adec="http://schemas.microsoft.com/office/drawing/2017/decorative" xmlns="" val="1"/>
                 </a:ext>
               </a:extLst>
             </p:cNvPr>
@@ -21211,7 +21328,7 @@
                 <a16:creationId xmlns:a16="http://schemas.microsoft.com/office/drawing/2014/main" id="{BF4E480B-94D6-46F9-A2B6-B98D311FDC19}"/>
               </a:ext>
               <a:ext uri="{C183D7F6-B498-43B3-948B-1728B52AA6E4}">
-                <adec:decorative xmlns:adec="http://schemas.microsoft.com/office/drawing/2017/decorative" val="1"/>
+                <adec:decorative xmlns:adec="http://schemas.microsoft.com/office/drawing/2017/decorative" xmlns="" val="1"/>
               </a:ext>
             </a:extLst>
           </p:cNvPr>
@@ -21242,7 +21359,7 @@
                   <a16:creationId xmlns:a16="http://schemas.microsoft.com/office/drawing/2014/main" id="{07183CDE-91A1-40C3-8E80-66F89E1C2D53}"/>
                 </a:ext>
                 <a:ext uri="{C183D7F6-B498-43B3-948B-1728B52AA6E4}">
-                  <adec:decorative xmlns:adec="http://schemas.microsoft.com/office/drawing/2017/decorative" val="1"/>
+                  <adec:decorative xmlns:adec="http://schemas.microsoft.com/office/drawing/2017/decorative" xmlns="" val="1"/>
                 </a:ext>
               </a:extLst>
             </p:cNvPr>
@@ -21323,7 +21440,7 @@
                   <a16:creationId xmlns:a16="http://schemas.microsoft.com/office/drawing/2014/main" id="{A6756515-F9AA-46BD-8DD2-AA15BA492AC0}"/>
                 </a:ext>
                 <a:ext uri="{C183D7F6-B498-43B3-948B-1728B52AA6E4}">
-                  <adec:decorative xmlns:adec="http://schemas.microsoft.com/office/drawing/2017/decorative" val="1"/>
+                  <adec:decorative xmlns:adec="http://schemas.microsoft.com/office/drawing/2017/decorative" xmlns="" val="1"/>
                 </a:ext>
               </a:extLst>
             </p:cNvPr>
@@ -21391,7 +21508,7 @@
                   <a16:creationId xmlns:a16="http://schemas.microsoft.com/office/drawing/2014/main" id="{ABA365E2-8B71-408B-9092-0104216AC7AC}"/>
                 </a:ext>
                 <a:ext uri="{C183D7F6-B498-43B3-948B-1728B52AA6E4}">
-                  <adec:decorative xmlns:adec="http://schemas.microsoft.com/office/drawing/2017/decorative" val="1"/>
+                  <adec:decorative xmlns:adec="http://schemas.microsoft.com/office/drawing/2017/decorative" xmlns="" val="1"/>
                 </a:ext>
               </a:extLst>
             </p:cNvPr>
@@ -21459,7 +21576,7 @@
                   <a16:creationId xmlns:a16="http://schemas.microsoft.com/office/drawing/2014/main" id="{BEDB8D7A-1BF6-4CDB-B93A-7736955F5043}"/>
                 </a:ext>
                 <a:ext uri="{C183D7F6-B498-43B3-948B-1728B52AA6E4}">
-                  <adec:decorative xmlns:adec="http://schemas.microsoft.com/office/drawing/2017/decorative" val="1"/>
+                  <adec:decorative xmlns:adec="http://schemas.microsoft.com/office/drawing/2017/decorative" xmlns="" val="1"/>
                 </a:ext>
               </a:extLst>
             </p:cNvPr>
@@ -21490,7 +21607,7 @@
                     <a16:creationId xmlns:a16="http://schemas.microsoft.com/office/drawing/2014/main" id="{5AACD774-5167-46C7-8A62-6E2FE4BE9469}"/>
                   </a:ext>
                   <a:ext uri="{C183D7F6-B498-43B3-948B-1728B52AA6E4}">
-                    <adec:decorative xmlns:adec="http://schemas.microsoft.com/office/drawing/2017/decorative" val="1"/>
+                    <adec:decorative xmlns:adec="http://schemas.microsoft.com/office/drawing/2017/decorative" xmlns="" val="1"/>
                   </a:ext>
                 </a:extLst>
               </p:cNvPr>
@@ -21567,7 +21684,7 @@
                     <a16:creationId xmlns:a16="http://schemas.microsoft.com/office/drawing/2014/main" id="{06E0F2D8-452E-48F9-9912-C47EAEAE1802}"/>
                   </a:ext>
                   <a:ext uri="{C183D7F6-B498-43B3-948B-1728B52AA6E4}">
-                    <adec:decorative xmlns:adec="http://schemas.microsoft.com/office/drawing/2017/decorative" val="1"/>
+                    <adec:decorative xmlns:adec="http://schemas.microsoft.com/office/drawing/2017/decorative" xmlns="" val="1"/>
                   </a:ext>
                 </a:extLst>
               </p:cNvPr>
@@ -21645,7 +21762,7 @@
                   <a16:creationId xmlns:a16="http://schemas.microsoft.com/office/drawing/2014/main" id="{91FBBF95-430B-427C-A6E8-DB899217FC00}"/>
                 </a:ext>
                 <a:ext uri="{C183D7F6-B498-43B3-948B-1728B52AA6E4}">
-                  <adec:decorative xmlns:adec="http://schemas.microsoft.com/office/drawing/2017/decorative" val="1"/>
+                  <adec:decorative xmlns:adec="http://schemas.microsoft.com/office/drawing/2017/decorative" xmlns="" val="1"/>
                 </a:ext>
               </a:extLst>
             </p:cNvPr>
@@ -21676,7 +21793,7 @@
                     <a16:creationId xmlns:a16="http://schemas.microsoft.com/office/drawing/2014/main" id="{BEE64698-3ED2-4395-B7FC-65248E437E0A}"/>
                   </a:ext>
                   <a:ext uri="{C183D7F6-B498-43B3-948B-1728B52AA6E4}">
-                    <adec:decorative xmlns:adec="http://schemas.microsoft.com/office/drawing/2017/decorative" val="1"/>
+                    <adec:decorative xmlns:adec="http://schemas.microsoft.com/office/drawing/2017/decorative" xmlns="" val="1"/>
                   </a:ext>
                 </a:extLst>
               </p:cNvPr>
@@ -21753,7 +21870,7 @@
                     <a16:creationId xmlns:a16="http://schemas.microsoft.com/office/drawing/2014/main" id="{FE20B1E1-CE09-4C2A-A3FB-DB8026C54E98}"/>
                   </a:ext>
                   <a:ext uri="{C183D7F6-B498-43B3-948B-1728B52AA6E4}">
-                    <adec:decorative xmlns:adec="http://schemas.microsoft.com/office/drawing/2017/decorative" val="1"/>
+                    <adec:decorative xmlns:adec="http://schemas.microsoft.com/office/drawing/2017/decorative" xmlns="" val="1"/>
                   </a:ext>
                 </a:extLst>
               </p:cNvPr>
@@ -21831,7 +21948,7 @@
                   <a16:creationId xmlns:a16="http://schemas.microsoft.com/office/drawing/2014/main" id="{0CB2405B-A907-48B3-906A-FB3573C0B282}"/>
                 </a:ext>
                 <a:ext uri="{C183D7F6-B498-43B3-948B-1728B52AA6E4}">
-                  <adec:decorative xmlns:adec="http://schemas.microsoft.com/office/drawing/2017/decorative" val="1"/>
+                  <adec:decorative xmlns:adec="http://schemas.microsoft.com/office/drawing/2017/decorative" xmlns="" val="1"/>
                 </a:ext>
               </a:extLst>
             </p:cNvPr>
@@ -21911,7 +22028,7 @@
                 <a16:creationId xmlns:a16="http://schemas.microsoft.com/office/drawing/2014/main" id="{6DC8E2D9-6729-4614-8667-C1016D3182E4}"/>
               </a:ext>
               <a:ext uri="{C183D7F6-B498-43B3-948B-1728B52AA6E4}">
-                <adec:decorative xmlns:adec="http://schemas.microsoft.com/office/drawing/2017/decorative" val="1"/>
+                <adec:decorative xmlns:adec="http://schemas.microsoft.com/office/drawing/2017/decorative" xmlns="" val="1"/>
               </a:ext>
             </a:extLst>
           </p:cNvPr>
@@ -21979,7 +22096,7 @@
                 <a16:creationId xmlns:a16="http://schemas.microsoft.com/office/drawing/2014/main" id="{9C51935E-4A08-4AE4-8E13-F40CD3C4F1C4}"/>
               </a:ext>
               <a:ext uri="{C183D7F6-B498-43B3-948B-1728B52AA6E4}">
-                <adec:decorative xmlns:adec="http://schemas.microsoft.com/office/drawing/2017/decorative" val="1"/>
+                <adec:decorative xmlns:adec="http://schemas.microsoft.com/office/drawing/2017/decorative" xmlns="" val="1"/>
               </a:ext>
             </a:extLst>
           </p:cNvPr>
@@ -22127,7 +22244,7 @@
                 <a16:creationId xmlns:a16="http://schemas.microsoft.com/office/drawing/2014/main" id="{4B7AF231-444C-44D0-B791-BAFE395E36AC}"/>
               </a:ext>
               <a:ext uri="{C183D7F6-B498-43B3-948B-1728B52AA6E4}">
-                <adec:decorative xmlns:adec="http://schemas.microsoft.com/office/drawing/2017/decorative" val="1"/>
+                <adec:decorative xmlns:adec="http://schemas.microsoft.com/office/drawing/2017/decorative" xmlns="" val="1"/>
               </a:ext>
             </a:extLst>
           </p:cNvPr>
@@ -22158,7 +22275,7 @@
                   <a16:creationId xmlns:a16="http://schemas.microsoft.com/office/drawing/2014/main" id="{6152793A-5125-41FA-AEF6-96C5463D0A76}"/>
                 </a:ext>
                 <a:ext uri="{C183D7F6-B498-43B3-948B-1728B52AA6E4}">
-                  <adec:decorative xmlns:adec="http://schemas.microsoft.com/office/drawing/2017/decorative" val="1"/>
+                  <adec:decorative xmlns:adec="http://schemas.microsoft.com/office/drawing/2017/decorative" xmlns="" val="1"/>
                 </a:ext>
               </a:extLst>
             </p:cNvPr>
@@ -22226,7 +22343,7 @@
                   <a16:creationId xmlns:a16="http://schemas.microsoft.com/office/drawing/2014/main" id="{63C1632F-098D-4A05-B248-04B7ABFE0060}"/>
                 </a:ext>
                 <a:ext uri="{C183D7F6-B498-43B3-948B-1728B52AA6E4}">
-                  <adec:decorative xmlns:adec="http://schemas.microsoft.com/office/drawing/2017/decorative" val="1"/>
+                  <adec:decorative xmlns:adec="http://schemas.microsoft.com/office/drawing/2017/decorative" xmlns="" val="1"/>
                 </a:ext>
               </a:extLst>
             </p:cNvPr>
@@ -22292,7 +22409,7 @@
                   <a16:creationId xmlns:a16="http://schemas.microsoft.com/office/drawing/2014/main" id="{0A85C0F5-DDEB-454E-A0E4-B6F0FB4CAB12}"/>
                 </a:ext>
                 <a:ext uri="{C183D7F6-B498-43B3-948B-1728B52AA6E4}">
-                  <adec:decorative xmlns:adec="http://schemas.microsoft.com/office/drawing/2017/decorative" val="1"/>
+                  <adec:decorative xmlns:adec="http://schemas.microsoft.com/office/drawing/2017/decorative" xmlns="" val="1"/>
                 </a:ext>
               </a:extLst>
             </p:cNvPr>

</xml_diff>